<commit_message>
changed TS from 8 to 3
</commit_message>
<xml_diff>
--- a/src/SE_ELAN_offline/Stimuli/Instructions_new_patient.pptx
+++ b/src/SE_ELAN_offline/Stimuli/Instructions_new_patient.pptx
@@ -229,7 +229,7 @@
           <a:p>
             <a:fld id="{457B588A-FAB3-4C3F-A999-7E77BA0B8118}" type="datetimeFigureOut">
               <a:rPr lang="en-GB" smtClean="0"/>
-              <a:t>03/12/2021</a:t>
+              <a:t>05/12/2021</a:t>
             </a:fld>
             <a:endParaRPr lang="en-GB"/>
           </a:p>
@@ -295,7 +295,7 @@
           <a:p>
             <a:fld id="{756993CC-A683-496E-881E-006544134775}" type="slidenum">
               <a:rPr lang="en-GB" smtClean="0"/>
-              <a:t>‹N°›</a:t>
+              <a:t>‹#›</a:t>
             </a:fld>
             <a:endParaRPr lang="en-GB"/>
           </a:p>
@@ -443,7 +443,7 @@
           <a:p>
             <a:fld id="{1C2A38D2-D57A-4E64-B95F-0826012D069A}" type="datetimeFigureOut">
               <a:rPr lang="en-GB" smtClean="0"/>
-              <a:t>03/12/2021</a:t>
+              <a:t>05/12/2021</a:t>
             </a:fld>
             <a:endParaRPr lang="en-GB" dirty="0"/>
           </a:p>
@@ -485,7 +485,7 @@
           <a:p>
             <a:fld id="{9D7F7A4F-C86B-4E97-8396-79EF10BBD040}" type="slidenum">
               <a:rPr lang="en-GB" smtClean="0"/>
-              <a:t>‹N°›</a:t>
+              <a:t>‹#›</a:t>
             </a:fld>
             <a:endParaRPr lang="en-GB" dirty="0"/>
           </a:p>
@@ -613,7 +613,7 @@
           <a:p>
             <a:fld id="{1C2A38D2-D57A-4E64-B95F-0826012D069A}" type="datetimeFigureOut">
               <a:rPr lang="en-GB" smtClean="0"/>
-              <a:t>03/12/2021</a:t>
+              <a:t>05/12/2021</a:t>
             </a:fld>
             <a:endParaRPr lang="en-GB" dirty="0"/>
           </a:p>
@@ -655,7 +655,7 @@
           <a:p>
             <a:fld id="{9D7F7A4F-C86B-4E97-8396-79EF10BBD040}" type="slidenum">
               <a:rPr lang="en-GB" smtClean="0"/>
-              <a:t>‹N°›</a:t>
+              <a:t>‹#›</a:t>
             </a:fld>
             <a:endParaRPr lang="en-GB" dirty="0"/>
           </a:p>
@@ -793,7 +793,7 @@
           <a:p>
             <a:fld id="{1C2A38D2-D57A-4E64-B95F-0826012D069A}" type="datetimeFigureOut">
               <a:rPr lang="en-GB" smtClean="0"/>
-              <a:t>03/12/2021</a:t>
+              <a:t>05/12/2021</a:t>
             </a:fld>
             <a:endParaRPr lang="en-GB" dirty="0"/>
           </a:p>
@@ -835,7 +835,7 @@
           <a:p>
             <a:fld id="{9D7F7A4F-C86B-4E97-8396-79EF10BBD040}" type="slidenum">
               <a:rPr lang="en-GB" smtClean="0"/>
-              <a:t>‹N°›</a:t>
+              <a:t>‹#›</a:t>
             </a:fld>
             <a:endParaRPr lang="en-GB" dirty="0"/>
           </a:p>
@@ -963,7 +963,7 @@
           <a:p>
             <a:fld id="{1C2A38D2-D57A-4E64-B95F-0826012D069A}" type="datetimeFigureOut">
               <a:rPr lang="en-GB" smtClean="0"/>
-              <a:t>03/12/2021</a:t>
+              <a:t>05/12/2021</a:t>
             </a:fld>
             <a:endParaRPr lang="en-GB" dirty="0"/>
           </a:p>
@@ -1005,7 +1005,7 @@
           <a:p>
             <a:fld id="{9D7F7A4F-C86B-4E97-8396-79EF10BBD040}" type="slidenum">
               <a:rPr lang="en-GB" smtClean="0"/>
-              <a:t>‹N°›</a:t>
+              <a:t>‹#›</a:t>
             </a:fld>
             <a:endParaRPr lang="en-GB" dirty="0"/>
           </a:p>
@@ -1209,7 +1209,7 @@
           <a:p>
             <a:fld id="{1C2A38D2-D57A-4E64-B95F-0826012D069A}" type="datetimeFigureOut">
               <a:rPr lang="en-GB" smtClean="0"/>
-              <a:t>03/12/2021</a:t>
+              <a:t>05/12/2021</a:t>
             </a:fld>
             <a:endParaRPr lang="en-GB" dirty="0"/>
           </a:p>
@@ -1251,7 +1251,7 @@
           <a:p>
             <a:fld id="{9D7F7A4F-C86B-4E97-8396-79EF10BBD040}" type="slidenum">
               <a:rPr lang="en-GB" smtClean="0"/>
-              <a:t>‹N°›</a:t>
+              <a:t>‹#›</a:t>
             </a:fld>
             <a:endParaRPr lang="en-GB" dirty="0"/>
           </a:p>
@@ -1441,7 +1441,7 @@
           <a:p>
             <a:fld id="{1C2A38D2-D57A-4E64-B95F-0826012D069A}" type="datetimeFigureOut">
               <a:rPr lang="en-GB" smtClean="0"/>
-              <a:t>03/12/2021</a:t>
+              <a:t>05/12/2021</a:t>
             </a:fld>
             <a:endParaRPr lang="en-GB" dirty="0"/>
           </a:p>
@@ -1483,7 +1483,7 @@
           <a:p>
             <a:fld id="{9D7F7A4F-C86B-4E97-8396-79EF10BBD040}" type="slidenum">
               <a:rPr lang="en-GB" smtClean="0"/>
-              <a:t>‹N°›</a:t>
+              <a:t>‹#›</a:t>
             </a:fld>
             <a:endParaRPr lang="en-GB" dirty="0"/>
           </a:p>
@@ -1808,7 +1808,7 @@
           <a:p>
             <a:fld id="{1C2A38D2-D57A-4E64-B95F-0826012D069A}" type="datetimeFigureOut">
               <a:rPr lang="en-GB" smtClean="0"/>
-              <a:t>03/12/2021</a:t>
+              <a:t>05/12/2021</a:t>
             </a:fld>
             <a:endParaRPr lang="en-GB" dirty="0"/>
           </a:p>
@@ -1850,7 +1850,7 @@
           <a:p>
             <a:fld id="{9D7F7A4F-C86B-4E97-8396-79EF10BBD040}" type="slidenum">
               <a:rPr lang="en-GB" smtClean="0"/>
-              <a:t>‹N°›</a:t>
+              <a:t>‹#›</a:t>
             </a:fld>
             <a:endParaRPr lang="en-GB" dirty="0"/>
           </a:p>
@@ -1926,7 +1926,7 @@
           <a:p>
             <a:fld id="{1C2A38D2-D57A-4E64-B95F-0826012D069A}" type="datetimeFigureOut">
               <a:rPr lang="en-GB" smtClean="0"/>
-              <a:t>03/12/2021</a:t>
+              <a:t>05/12/2021</a:t>
             </a:fld>
             <a:endParaRPr lang="en-GB" dirty="0"/>
           </a:p>
@@ -1968,7 +1968,7 @@
           <a:p>
             <a:fld id="{9D7F7A4F-C86B-4E97-8396-79EF10BBD040}" type="slidenum">
               <a:rPr lang="en-GB" smtClean="0"/>
-              <a:t>‹N°›</a:t>
+              <a:t>‹#›</a:t>
             </a:fld>
             <a:endParaRPr lang="en-GB" dirty="0"/>
           </a:p>
@@ -2021,7 +2021,7 @@
           <a:p>
             <a:fld id="{1C2A38D2-D57A-4E64-B95F-0826012D069A}" type="datetimeFigureOut">
               <a:rPr lang="en-GB" smtClean="0"/>
-              <a:t>03/12/2021</a:t>
+              <a:t>05/12/2021</a:t>
             </a:fld>
             <a:endParaRPr lang="en-GB" dirty="0"/>
           </a:p>
@@ -2063,7 +2063,7 @@
           <a:p>
             <a:fld id="{9D7F7A4F-C86B-4E97-8396-79EF10BBD040}" type="slidenum">
               <a:rPr lang="en-GB" smtClean="0"/>
-              <a:t>‹N°›</a:t>
+              <a:t>‹#›</a:t>
             </a:fld>
             <a:endParaRPr lang="en-GB" dirty="0"/>
           </a:p>
@@ -2298,7 +2298,7 @@
           <a:p>
             <a:fld id="{1C2A38D2-D57A-4E64-B95F-0826012D069A}" type="datetimeFigureOut">
               <a:rPr lang="en-GB" smtClean="0"/>
-              <a:t>03/12/2021</a:t>
+              <a:t>05/12/2021</a:t>
             </a:fld>
             <a:endParaRPr lang="en-GB" dirty="0"/>
           </a:p>
@@ -2340,7 +2340,7 @@
           <a:p>
             <a:fld id="{9D7F7A4F-C86B-4E97-8396-79EF10BBD040}" type="slidenum">
               <a:rPr lang="en-GB" smtClean="0"/>
-              <a:t>‹N°›</a:t>
+              <a:t>‹#›</a:t>
             </a:fld>
             <a:endParaRPr lang="en-GB" dirty="0"/>
           </a:p>
@@ -2551,7 +2551,7 @@
           <a:p>
             <a:fld id="{1C2A38D2-D57A-4E64-B95F-0826012D069A}" type="datetimeFigureOut">
               <a:rPr lang="en-GB" smtClean="0"/>
-              <a:t>03/12/2021</a:t>
+              <a:t>05/12/2021</a:t>
             </a:fld>
             <a:endParaRPr lang="en-GB" dirty="0"/>
           </a:p>
@@ -2593,7 +2593,7 @@
           <a:p>
             <a:fld id="{9D7F7A4F-C86B-4E97-8396-79EF10BBD040}" type="slidenum">
               <a:rPr lang="en-GB" smtClean="0"/>
-              <a:t>‹N°›</a:t>
+              <a:t>‹#›</a:t>
             </a:fld>
             <a:endParaRPr lang="en-GB" dirty="0"/>
           </a:p>
@@ -2764,7 +2764,7 @@
           <a:p>
             <a:fld id="{1C2A38D2-D57A-4E64-B95F-0826012D069A}" type="datetimeFigureOut">
               <a:rPr lang="en-GB" smtClean="0"/>
-              <a:t>03/12/2021</a:t>
+              <a:t>05/12/2021</a:t>
             </a:fld>
             <a:endParaRPr lang="en-GB" dirty="0"/>
           </a:p>
@@ -2842,7 +2842,7 @@
           <a:p>
             <a:fld id="{9D7F7A4F-C86B-4E97-8396-79EF10BBD040}" type="slidenum">
               <a:rPr lang="en-GB" smtClean="0"/>
-              <a:t>‹N°›</a:t>
+              <a:t>‹#›</a:t>
             </a:fld>
             <a:endParaRPr lang="en-GB" dirty="0"/>
           </a:p>
@@ -7795,15 +7795,7 @@
             <a:pPr algn="ctr"/>
             <a:r>
               <a:rPr lang="en-GB" sz="2400" dirty="0"/>
-              <a:t>Ce test dure environs </a:t>
-            </a:r>
-            <a:r>
-              <a:rPr lang="en-GB" sz="2400" dirty="0" smtClean="0"/>
-              <a:t>55 </a:t>
-            </a:r>
-            <a:r>
-              <a:rPr lang="en-GB" sz="2400" dirty="0"/>
-              <a:t>minutes.</a:t>
+              <a:t>Ce test dure environs 55 minutes.</a:t>
             </a:r>
           </a:p>
           <a:p>
@@ -9144,10 +9136,9 @@
           <a:lstStyle/>
           <a:p>
             <a:r>
-              <a:rPr lang="en-GB" sz="1600" b="1" dirty="0" smtClean="0"/>
+              <a:rPr lang="en-GB" sz="1600" b="1" dirty="0"/>
               <a:t>8</a:t>
             </a:r>
-            <a:endParaRPr lang="en-GB" sz="1600" b="1" dirty="0"/>
           </a:p>
         </p:txBody>
       </p:sp>
@@ -9511,19 +9502,7 @@
             </a:pPr>
             <a:r>
               <a:rPr lang="fr-FR" sz="2400" dirty="0"/>
-              <a:t>Note: vous avez </a:t>
-            </a:r>
-            <a:r>
-              <a:rPr lang="fr-FR" sz="2400" dirty="0"/>
-              <a:t>8</a:t>
-            </a:r>
-            <a:r>
-              <a:rPr lang="fr-FR" sz="2400" dirty="0" smtClean="0"/>
-              <a:t> </a:t>
-            </a:r>
-            <a:r>
-              <a:rPr lang="fr-FR" sz="2400" dirty="0"/>
-              <a:t>secondes seulement pour répondre, après quoi la phase de </a:t>
+              <a:t>Note: vous avez 8 secondes seulement pour répondre, après quoi la phase de </a:t>
             </a:r>
             <a:r>
               <a:rPr lang="en-GB" sz="2400" dirty="0"/>
@@ -9746,10 +9725,9 @@
           <a:lstStyle/>
           <a:p>
             <a:r>
-              <a:rPr lang="en-GB" sz="1600" b="1" dirty="0" smtClean="0"/>
+              <a:rPr lang="en-GB" sz="1600" b="1" dirty="0"/>
               <a:t>8</a:t>
             </a:r>
-            <a:endParaRPr lang="en-GB" sz="1600" b="1" dirty="0"/>
           </a:p>
         </p:txBody>
       </p:sp>
@@ -10471,15 +10449,7 @@
             </a:pPr>
             <a:r>
               <a:rPr lang="fr-FR" sz="2400" dirty="0"/>
-              <a:t>Vous pourrez alors cliquer sur le bouton « Montrez-moi la prochaine paire », en bas </a:t>
-            </a:r>
-            <a:r>
-              <a:rPr lang="fr-FR" sz="2400" dirty="0" smtClean="0"/>
-              <a:t>de </a:t>
-            </a:r>
-            <a:r>
-              <a:rPr lang="fr-FR" sz="2400" dirty="0"/>
-              <a:t>la grille:</a:t>
+              <a:t>Vous pourrez alors cliquer sur le bouton « Montrez-moi la prochaine paire », en bas de la grille:</a:t>
             </a:r>
             <a:endParaRPr lang="fr-FR" sz="2400" b="1" dirty="0"/>
           </a:p>
@@ -13755,11 +13725,7 @@
               </a:r>
               <a:r>
                 <a:rPr lang="en-GB" sz="2400" dirty="0"/>
-                <a:t> </a:t>
-              </a:r>
-              <a:r>
-                <a:rPr lang="en-GB" sz="2400" dirty="0" smtClean="0"/>
-                <a:t>25 </a:t>
+                <a:t> 25 </a:t>
               </a:r>
               <a:r>
                 <a:rPr lang="en-GB" sz="2400" dirty="0" err="1"/>
@@ -14149,11 +14115,11 @@
               <a:t>, nous </a:t>
             </a:r>
             <a:r>
-              <a:rPr lang="en-GB" sz="2400" dirty="0" err="1" smtClean="0"/>
+              <a:rPr lang="en-GB" sz="2400" dirty="0" err="1"/>
               <a:t>voudrions</a:t>
             </a:r>
             <a:r>
-              <a:rPr lang="en-GB" sz="2400" dirty="0" smtClean="0"/>
+              <a:rPr lang="en-GB" sz="2400" dirty="0"/>
               <a:t> </a:t>
             </a:r>
             <a:r>
@@ -15013,11 +14979,7 @@
             </a:r>
             <a:r>
               <a:rPr lang="en-GB" sz="2400" dirty="0"/>
-              <a:t> </a:t>
-            </a:r>
-            <a:r>
-              <a:rPr lang="en-GB" sz="2400" dirty="0" smtClean="0"/>
-              <a:t>25 </a:t>
+              <a:t> 25 </a:t>
             </a:r>
             <a:r>
               <a:rPr lang="fr-FR" sz="2400" dirty="0"/>
@@ -15028,14 +14990,13 @@
               <a:t> de </a:t>
             </a:r>
             <a:r>
-              <a:rPr lang="en-GB" sz="2400" dirty="0" err="1" smtClean="0"/>
+              <a:rPr lang="en-GB" sz="2400" dirty="0" err="1"/>
               <a:t>mémoire</a:t>
             </a:r>
             <a:r>
-              <a:rPr lang="en-GB" sz="2400" dirty="0" smtClean="0"/>
+              <a:rPr lang="en-GB" sz="2400" dirty="0"/>
               <a:t>.</a:t>
             </a:r>
-            <a:endParaRPr lang="en-GB" sz="2400" dirty="0"/>
           </a:p>
           <a:p>
             <a:pPr algn="ctr"/>
@@ -15045,15 +15006,7 @@
             <a:pPr algn="ctr"/>
             <a:r>
               <a:rPr lang="fr-FR" sz="2400" dirty="0"/>
-              <a:t>Lors de chaque exercice de </a:t>
-            </a:r>
-            <a:r>
-              <a:rPr lang="fr-FR" sz="2400" dirty="0" smtClean="0"/>
-              <a:t>mémoire, </a:t>
-            </a:r>
-            <a:r>
-              <a:rPr lang="fr-FR" sz="2400" dirty="0"/>
-              <a:t>vous adapterez votre effort pour essayer d’atteindre le score cible de l’exercice. Cela dit, vous ne serez pas toujours capable de réussir.</a:t>
+              <a:t>Lors de chaque exercice de mémoire, vous adapterez votre effort pour essayer d’atteindre le score cible de l’exercice. Cela dit, vous ne serez pas toujours capable de réussir.</a:t>
             </a:r>
           </a:p>
           <a:p>

</xml_diff>